<commit_message>
Minor u case updates
</commit_message>
<xml_diff>
--- a/UserAsACase/user_as_a_case.pptx
+++ b/UserAsACase/user_as_a_case.pptx
@@ -3220,11 +3220,21 @@
             </a:pPr>
             <a:r>
               <a:rPr lang="en-US" dirty="0" smtClean="0"/>
-              <a:t>Use the User Case to record how </a:t>
+              <a:t>Use the User Case to record how many children a worker has registered</a:t>
+            </a:r>
+          </a:p>
+          <a:p>
+            <a:pPr marL="457200" indent="-457200">
+              <a:buFont typeface="+mj-lt"/>
+              <a:buAutoNum type="arabicPeriod"/>
+            </a:pPr>
+            <a:r>
+              <a:rPr lang="en-US" dirty="0" smtClean="0"/>
+              <a:t>Output that value as </a:t>
             </a:r>
             <a:r>
               <a:rPr lang="en-US" smtClean="0"/>
-              <a:t>many children a worker has registered</a:t>
+              <a:t>a label at the end of the form</a:t>
             </a:r>
             <a:endParaRPr lang="en-US" dirty="0" smtClean="0"/>
           </a:p>

</xml_diff>